<commit_message>
Made minor changes to the project poster
</commit_message>
<xml_diff>
--- a/final_proj_posterCLJL.pptx
+++ b/final_proj_posterCLJL.pptx
@@ -217,7 +217,7 @@
           <a:p>
             <a:fld id="{D0FE861C-486B-4E18-A0E9-A790238A915C}" type="datetimeFigureOut">
               <a:rPr lang="en-US" smtClean="0"/>
-              <a:t>11/26/24</a:t>
+              <a:t>12/1/25</a:t>
             </a:fld>
             <a:endParaRPr lang="en-US"/>
           </a:p>
@@ -751,7 +751,7 @@
           <a:p>
             <a:fld id="{8102BAB4-8B8D-41DD-85C7-81A0CA962007}" type="datetimeFigureOut">
               <a:rPr lang="en-US" smtClean="0"/>
-              <a:t>11/26/24</a:t>
+              <a:t>12/1/25</a:t>
             </a:fld>
             <a:endParaRPr lang="en-US"/>
           </a:p>
@@ -914,7 +914,7 @@
           <a:p>
             <a:fld id="{8102BAB4-8B8D-41DD-85C7-81A0CA962007}" type="datetimeFigureOut">
               <a:rPr lang="en-US" smtClean="0"/>
-              <a:t>11/26/24</a:t>
+              <a:t>12/1/25</a:t>
             </a:fld>
             <a:endParaRPr lang="en-US"/>
           </a:p>
@@ -1087,7 +1087,7 @@
           <a:p>
             <a:fld id="{8102BAB4-8B8D-41DD-85C7-81A0CA962007}" type="datetimeFigureOut">
               <a:rPr lang="en-US" smtClean="0"/>
-              <a:t>11/26/24</a:t>
+              <a:t>12/1/25</a:t>
             </a:fld>
             <a:endParaRPr lang="en-US"/>
           </a:p>
@@ -1250,7 +1250,7 @@
           <a:p>
             <a:fld id="{8102BAB4-8B8D-41DD-85C7-81A0CA962007}" type="datetimeFigureOut">
               <a:rPr lang="en-US" smtClean="0"/>
-              <a:t>11/26/24</a:t>
+              <a:t>12/1/25</a:t>
             </a:fld>
             <a:endParaRPr lang="en-US"/>
           </a:p>
@@ -1490,7 +1490,7 @@
           <a:p>
             <a:fld id="{8102BAB4-8B8D-41DD-85C7-81A0CA962007}" type="datetimeFigureOut">
               <a:rPr lang="en-US" smtClean="0"/>
-              <a:t>11/26/24</a:t>
+              <a:t>12/1/25</a:t>
             </a:fld>
             <a:endParaRPr lang="en-US"/>
           </a:p>
@@ -1770,7 +1770,7 @@
           <a:p>
             <a:fld id="{8102BAB4-8B8D-41DD-85C7-81A0CA962007}" type="datetimeFigureOut">
               <a:rPr lang="en-US" smtClean="0"/>
-              <a:t>11/26/24</a:t>
+              <a:t>12/1/25</a:t>
             </a:fld>
             <a:endParaRPr lang="en-US"/>
           </a:p>
@@ -2184,7 +2184,7 @@
           <a:p>
             <a:fld id="{8102BAB4-8B8D-41DD-85C7-81A0CA962007}" type="datetimeFigureOut">
               <a:rPr lang="en-US" smtClean="0"/>
-              <a:t>11/26/24</a:t>
+              <a:t>12/1/25</a:t>
             </a:fld>
             <a:endParaRPr lang="en-US"/>
           </a:p>
@@ -2296,7 +2296,7 @@
           <a:p>
             <a:fld id="{8102BAB4-8B8D-41DD-85C7-81A0CA962007}" type="datetimeFigureOut">
               <a:rPr lang="en-US" smtClean="0"/>
-              <a:t>11/26/24</a:t>
+              <a:t>12/1/25</a:t>
             </a:fld>
             <a:endParaRPr lang="en-US"/>
           </a:p>
@@ -2386,7 +2386,7 @@
           <a:p>
             <a:fld id="{8102BAB4-8B8D-41DD-85C7-81A0CA962007}" type="datetimeFigureOut">
               <a:rPr lang="en-US" smtClean="0"/>
-              <a:t>11/26/24</a:t>
+              <a:t>12/1/25</a:t>
             </a:fld>
             <a:endParaRPr lang="en-US"/>
           </a:p>
@@ -2656,7 +2656,7 @@
           <a:p>
             <a:fld id="{8102BAB4-8B8D-41DD-85C7-81A0CA962007}" type="datetimeFigureOut">
               <a:rPr lang="en-US" smtClean="0"/>
-              <a:t>11/26/24</a:t>
+              <a:t>12/1/25</a:t>
             </a:fld>
             <a:endParaRPr lang="en-US"/>
           </a:p>
@@ -2903,7 +2903,7 @@
           <a:p>
             <a:fld id="{8102BAB4-8B8D-41DD-85C7-81A0CA962007}" type="datetimeFigureOut">
               <a:rPr lang="en-US" smtClean="0"/>
-              <a:t>11/26/24</a:t>
+              <a:t>12/1/25</a:t>
             </a:fld>
             <a:endParaRPr lang="en-US"/>
           </a:p>
@@ -3109,7 +3109,7 @@
           <a:p>
             <a:fld id="{8102BAB4-8B8D-41DD-85C7-81A0CA962007}" type="datetimeFigureOut">
               <a:rPr lang="en-US" smtClean="0"/>
-              <a:t>11/26/24</a:t>
+              <a:t>12/1/25</a:t>
             </a:fld>
             <a:endParaRPr lang="en-US"/>
           </a:p>
@@ -4072,7 +4072,7 @@
                 <a:ea typeface="Bangla MN" charset="0"/>
                 <a:cs typeface="Bangla MN" charset="0"/>
               </a:rPr>
-              <a:t>Your Name, Your Name</a:t>
+              <a:t>Chu Lei, Jennifer Linnaea</a:t>
             </a:r>
             <a:endParaRPr lang="en-US" sz="4200" b="1" baseline="30000" dirty="0">
               <a:latin typeface="Bangla MN" charset="0"/>
@@ -4218,7 +4218,7 @@
                 <a:ea typeface="Bangla MN" charset="0"/>
                 <a:cs typeface="Bangla MN" charset="0"/>
               </a:rPr>
-              <a:t>University of Oregon, Department of XXX</a:t>
+              <a:t>University of Oregon, Department of Biology</a:t>
             </a:r>
           </a:p>
         </p:txBody>
@@ -5241,26 +5241,6 @@
 </file>
 
 <file path=customXml/item1.xml><?xml version="1.0" encoding="utf-8"?>
-<?mso-contentType ?>
-<FormTemplates xmlns="http://schemas.microsoft.com/sharepoint/v3/contenttype/forms">
-  <Display>DocumentLibraryForm</Display>
-  <Edit>DocumentLibraryForm</Edit>
-  <New>DocumentLibraryForm</New>
-</FormTemplates>
-</file>
-
-<file path=customXml/item2.xml><?xml version="1.0" encoding="utf-8"?>
-<p:properties xmlns:p="http://schemas.microsoft.com/office/2006/metadata/properties" xmlns:xsi="http://www.w3.org/2001/XMLSchema-instance" xmlns:pc="http://schemas.microsoft.com/office/infopath/2007/PartnerControls">
-  <documentManagement>
-    <lcf76f155ced4ddcb4097134ff3c332f xmlns="73564203-f0fe-4ae8-8e9f-3aa859c33a2a">
-      <Terms xmlns="http://schemas.microsoft.com/office/infopath/2007/PartnerControls"/>
-    </lcf76f155ced4ddcb4097134ff3c332f>
-    <TaxCatchAll xmlns="c340c53f-212a-43d4-943a-cf81f31f3e59" xsi:nil="true"/>
-  </documentManagement>
-</p:properties>
-</file>
-
-<file path=customXml/item3.xml><?xml version="1.0" encoding="utf-8"?>
 <ct:contentTypeSchema xmlns:ct="http://schemas.microsoft.com/office/2006/metadata/contentType" xmlns:ma="http://schemas.microsoft.com/office/2006/metadata/properties/metaAttributes" ct:_="" ma:_="" ma:contentTypeName="Document" ma:contentTypeID="0x01010066F9213B59404E43A44CE396F0EB41DB" ma:contentTypeVersion="17" ma:contentTypeDescription="Create a new document." ma:contentTypeScope="" ma:versionID="fce6b45a062a2e822901d4c016292851">
   <xsd:schema xmlns:xsd="http://www.w3.org/2001/XMLSchema" xmlns:xs="http://www.w3.org/2001/XMLSchema" xmlns:p="http://schemas.microsoft.com/office/2006/metadata/properties" xmlns:ns2="73564203-f0fe-4ae8-8e9f-3aa859c33a2a" xmlns:ns3="c340c53f-212a-43d4-943a-cf81f31f3e59" targetNamespace="http://schemas.microsoft.com/office/2006/metadata/properties" ma:root="true" ma:fieldsID="f9b970dbccb805e6d96bd6c5112c9d7e" ns2:_="" ns3:_="">
     <xsd:import namespace="73564203-f0fe-4ae8-8e9f-3aa859c33a2a"/>
@@ -5509,10 +5489,41 @@
 </ct:contentTypeSchema>
 </file>
 
+<file path=customXml/item2.xml><?xml version="1.0" encoding="utf-8"?>
+<p:properties xmlns:p="http://schemas.microsoft.com/office/2006/metadata/properties" xmlns:xsi="http://www.w3.org/2001/XMLSchema-instance" xmlns:pc="http://schemas.microsoft.com/office/infopath/2007/PartnerControls">
+  <documentManagement>
+    <lcf76f155ced4ddcb4097134ff3c332f xmlns="73564203-f0fe-4ae8-8e9f-3aa859c33a2a">
+      <Terms xmlns="http://schemas.microsoft.com/office/infopath/2007/PartnerControls"/>
+    </lcf76f155ced4ddcb4097134ff3c332f>
+    <TaxCatchAll xmlns="c340c53f-212a-43d4-943a-cf81f31f3e59" xsi:nil="true"/>
+  </documentManagement>
+</p:properties>
+</file>
+
+<file path=customXml/item3.xml><?xml version="1.0" encoding="utf-8"?>
+<?mso-contentType ?>
+<FormTemplates xmlns="http://schemas.microsoft.com/sharepoint/v3/contenttype/forms">
+  <Display>DocumentLibraryForm</Display>
+  <Edit>DocumentLibraryForm</Edit>
+  <New>DocumentLibraryForm</New>
+</FormTemplates>
+</file>
+
 <file path=customXml/itemProps1.xml><?xml version="1.0" encoding="utf-8"?>
-<ds:datastoreItem xmlns:ds="http://schemas.openxmlformats.org/officeDocument/2006/customXml" ds:itemID="{2EAA44C3-3866-494C-9120-7B42F7968B8D}">
+<ds:datastoreItem xmlns:ds="http://schemas.openxmlformats.org/officeDocument/2006/customXml" ds:itemID="{B10FC363-817C-4BB3-9BF9-B2C7071C4997}">
   <ds:schemaRefs>
-    <ds:schemaRef ds:uri="http://schemas.microsoft.com/sharepoint/v3/contenttype/forms"/>
+    <ds:schemaRef ds:uri="http://schemas.microsoft.com/office/2006/metadata/contentType"/>
+    <ds:schemaRef ds:uri="http://schemas.microsoft.com/office/2006/metadata/properties/metaAttributes"/>
+    <ds:schemaRef ds:uri="http://www.w3.org/2001/XMLSchema"/>
+    <ds:schemaRef ds:uri="http://schemas.microsoft.com/office/2006/metadata/properties"/>
+    <ds:schemaRef ds:uri="73564203-f0fe-4ae8-8e9f-3aa859c33a2a"/>
+    <ds:schemaRef ds:uri="c340c53f-212a-43d4-943a-cf81f31f3e59"/>
+    <ds:schemaRef ds:uri="http://schemas.microsoft.com/office/2006/documentManagement/types"/>
+    <ds:schemaRef ds:uri="http://schemas.microsoft.com/office/infopath/2007/PartnerControls"/>
+    <ds:schemaRef ds:uri="http://schemas.openxmlformats.org/package/2006/metadata/core-properties"/>
+    <ds:schemaRef ds:uri="http://purl.org/dc/elements/1.1/"/>
+    <ds:schemaRef ds:uri="http://purl.org/dc/terms/"/>
+    <ds:schemaRef ds:uri="http://schemas.microsoft.com/internal/obd"/>
   </ds:schemaRefs>
 </ds:datastoreItem>
 </file>
@@ -5535,20 +5546,9 @@
 </file>
 
 <file path=customXml/itemProps3.xml><?xml version="1.0" encoding="utf-8"?>
-<ds:datastoreItem xmlns:ds="http://schemas.openxmlformats.org/officeDocument/2006/customXml" ds:itemID="{B10FC363-817C-4BB3-9BF9-B2C7071C4997}">
+<ds:datastoreItem xmlns:ds="http://schemas.openxmlformats.org/officeDocument/2006/customXml" ds:itemID="{2EAA44C3-3866-494C-9120-7B42F7968B8D}">
   <ds:schemaRefs>
-    <ds:schemaRef ds:uri="http://schemas.microsoft.com/office/2006/metadata/contentType"/>
-    <ds:schemaRef ds:uri="http://schemas.microsoft.com/office/2006/metadata/properties/metaAttributes"/>
-    <ds:schemaRef ds:uri="http://www.w3.org/2001/XMLSchema"/>
-    <ds:schemaRef ds:uri="http://schemas.microsoft.com/office/2006/metadata/properties"/>
-    <ds:schemaRef ds:uri="73564203-f0fe-4ae8-8e9f-3aa859c33a2a"/>
-    <ds:schemaRef ds:uri="c340c53f-212a-43d4-943a-cf81f31f3e59"/>
-    <ds:schemaRef ds:uri="http://schemas.microsoft.com/office/2006/documentManagement/types"/>
-    <ds:schemaRef ds:uri="http://schemas.microsoft.com/office/infopath/2007/PartnerControls"/>
-    <ds:schemaRef ds:uri="http://schemas.openxmlformats.org/package/2006/metadata/core-properties"/>
-    <ds:schemaRef ds:uri="http://purl.org/dc/elements/1.1/"/>
-    <ds:schemaRef ds:uri="http://purl.org/dc/terms/"/>
-    <ds:schemaRef ds:uri="http://schemas.microsoft.com/internal/obd"/>
+    <ds:schemaRef ds:uri="http://schemas.microsoft.com/sharepoint/v3/contenttype/forms"/>
   </ds:schemaRefs>
 </ds:datastoreItem>
 </file>
</xml_diff>

<commit_message>
Added the p-value to the poster
</commit_message>
<xml_diff>
--- a/final_proj_posterCLJL.pptx
+++ b/final_proj_posterCLJL.pptx
@@ -3325,8 +3325,8 @@
     <dgm:cxn modelId="{7A633D42-DFD7-42D5-B49A-D8E46BB28DED}" type="presOf" srcId="{6EDEF63E-296D-4E9C-BD18-5F05AA4439C3}" destId="{9FA36F8D-1831-4E9F-B0E4-5C32923C7C1C}" srcOrd="0" destOrd="0" presId="urn:microsoft.com/office/officeart/2008/layout/HorizontalMultiLevelHierarchy"/>
     <dgm:cxn modelId="{662EE444-6A8C-42B4-8896-0561342E96C6}" type="presOf" srcId="{19A5F07E-93B4-47DF-9980-F80757511EE6}" destId="{09184C92-221E-45F1-8661-97B5B5473431}" srcOrd="0" destOrd="0" presId="urn:microsoft.com/office/officeart/2008/layout/HorizontalMultiLevelHierarchy"/>
     <dgm:cxn modelId="{E7283647-7A5E-4771-8DE8-D659E34D3BAB}" srcId="{031260B9-C8F0-415D-BB12-5F98FAD0A145}" destId="{F3A1B37A-355A-47FF-82E6-EE69A27B8B87}" srcOrd="0" destOrd="0" parTransId="{6EDEF63E-296D-4E9C-BD18-5F05AA4439C3}" sibTransId="{97455F4F-5AF4-41A3-B0B7-898CB48908A3}"/>
+    <dgm:cxn modelId="{0191024F-A23A-44EE-9732-E34FA529F59F}" srcId="{0ACCDA85-508B-4AFF-9B4D-AAC2A6E3B5A4}" destId="{031260B9-C8F0-415D-BB12-5F98FAD0A145}" srcOrd="0" destOrd="0" parTransId="{507B4C9D-2538-4686-9879-93E2ABEE8BDC}" sibTransId="{7812B71F-59E0-4A94-854E-87583EA1C084}"/>
     <dgm:cxn modelId="{3467B36D-6A0A-4F2D-8C57-9A880771DCB1}" type="presOf" srcId="{5AD33756-1903-4ABE-B536-A47F74E612A4}" destId="{B1ED1BA2-5753-4612-941E-BB160DE8A5B2}" srcOrd="0" destOrd="0" presId="urn:microsoft.com/office/officeart/2008/layout/HorizontalMultiLevelHierarchy"/>
-    <dgm:cxn modelId="{0191024F-A23A-44EE-9732-E34FA529F59F}" srcId="{0ACCDA85-508B-4AFF-9B4D-AAC2A6E3B5A4}" destId="{031260B9-C8F0-415D-BB12-5F98FAD0A145}" srcOrd="0" destOrd="0" parTransId="{507B4C9D-2538-4686-9879-93E2ABEE8BDC}" sibTransId="{7812B71F-59E0-4A94-854E-87583EA1C084}"/>
     <dgm:cxn modelId="{B96CD08C-0B3B-470C-BC94-A2EB3CD59C39}" type="presOf" srcId="{8D9744CC-AE09-4D43-AC86-17D836FF01D7}" destId="{F00423B9-6E23-405A-B4AA-BEE0C6FF45F6}" srcOrd="0" destOrd="0" presId="urn:microsoft.com/office/officeart/2008/layout/HorizontalMultiLevelHierarchy"/>
     <dgm:cxn modelId="{FC2A228D-DEB4-4B90-867D-ABA02E6D8194}" type="presOf" srcId="{19A5F07E-93B4-47DF-9980-F80757511EE6}" destId="{A3BA7661-C915-49DD-AADD-BEAE63E17B35}" srcOrd="1" destOrd="0" presId="urn:microsoft.com/office/officeart/2008/layout/HorizontalMultiLevelHierarchy"/>
     <dgm:cxn modelId="{EF72D691-001D-4C78-8467-08DC3869845A}" srcId="{031260B9-C8F0-415D-BB12-5F98FAD0A145}" destId="{8D9744CC-AE09-4D43-AC86-17D836FF01D7}" srcOrd="3" destOrd="0" parTransId="{48E6F3B3-F97D-4588-BE4D-9DBF0607AB79}" sibTransId="{39A3203E-DD2F-4C73-8F31-C0DA3A238537}"/>
@@ -4050,7 +4050,7 @@
       </dsp:nvSpPr>
       <dsp:spPr>
         <a:xfrm>
-          <a:off x="2215208" y="1934179"/>
+          <a:off x="2215208" y="1934178"/>
           <a:ext cx="493549" cy="91440"/>
         </a:xfrm>
         <a:custGeom>
@@ -10159,7 +10159,7 @@
           <a:p>
             <a:fld id="{D0FE861C-486B-4E18-A0E9-A790238A915C}" type="datetimeFigureOut">
               <a:rPr lang="en-US" smtClean="0"/>
-              <a:t>12/1/2025</a:t>
+              <a:t>12/2/25</a:t>
             </a:fld>
             <a:endParaRPr lang="en-US"/>
           </a:p>
@@ -10693,7 +10693,7 @@
           <a:p>
             <a:fld id="{8102BAB4-8B8D-41DD-85C7-81A0CA962007}" type="datetimeFigureOut">
               <a:rPr lang="en-US" smtClean="0"/>
-              <a:t>12/1/2025</a:t>
+              <a:t>12/2/25</a:t>
             </a:fld>
             <a:endParaRPr lang="en-US"/>
           </a:p>
@@ -10856,7 +10856,7 @@
           <a:p>
             <a:fld id="{8102BAB4-8B8D-41DD-85C7-81A0CA962007}" type="datetimeFigureOut">
               <a:rPr lang="en-US" smtClean="0"/>
-              <a:t>12/1/2025</a:t>
+              <a:t>12/2/25</a:t>
             </a:fld>
             <a:endParaRPr lang="en-US"/>
           </a:p>
@@ -11029,7 +11029,7 @@
           <a:p>
             <a:fld id="{8102BAB4-8B8D-41DD-85C7-81A0CA962007}" type="datetimeFigureOut">
               <a:rPr lang="en-US" smtClean="0"/>
-              <a:t>12/1/2025</a:t>
+              <a:t>12/2/25</a:t>
             </a:fld>
             <a:endParaRPr lang="en-US"/>
           </a:p>
@@ -11192,7 +11192,7 @@
           <a:p>
             <a:fld id="{8102BAB4-8B8D-41DD-85C7-81A0CA962007}" type="datetimeFigureOut">
               <a:rPr lang="en-US" smtClean="0"/>
-              <a:t>12/1/2025</a:t>
+              <a:t>12/2/25</a:t>
             </a:fld>
             <a:endParaRPr lang="en-US"/>
           </a:p>
@@ -11432,7 +11432,7 @@
           <a:p>
             <a:fld id="{8102BAB4-8B8D-41DD-85C7-81A0CA962007}" type="datetimeFigureOut">
               <a:rPr lang="en-US" smtClean="0"/>
-              <a:t>12/1/2025</a:t>
+              <a:t>12/2/25</a:t>
             </a:fld>
             <a:endParaRPr lang="en-US"/>
           </a:p>
@@ -11712,7 +11712,7 @@
           <a:p>
             <a:fld id="{8102BAB4-8B8D-41DD-85C7-81A0CA962007}" type="datetimeFigureOut">
               <a:rPr lang="en-US" smtClean="0"/>
-              <a:t>12/1/2025</a:t>
+              <a:t>12/2/25</a:t>
             </a:fld>
             <a:endParaRPr lang="en-US"/>
           </a:p>
@@ -12126,7 +12126,7 @@
           <a:p>
             <a:fld id="{8102BAB4-8B8D-41DD-85C7-81A0CA962007}" type="datetimeFigureOut">
               <a:rPr lang="en-US" smtClean="0"/>
-              <a:t>12/1/2025</a:t>
+              <a:t>12/2/25</a:t>
             </a:fld>
             <a:endParaRPr lang="en-US"/>
           </a:p>
@@ -12238,7 +12238,7 @@
           <a:p>
             <a:fld id="{8102BAB4-8B8D-41DD-85C7-81A0CA962007}" type="datetimeFigureOut">
               <a:rPr lang="en-US" smtClean="0"/>
-              <a:t>12/1/2025</a:t>
+              <a:t>12/2/25</a:t>
             </a:fld>
             <a:endParaRPr lang="en-US"/>
           </a:p>
@@ -12328,7 +12328,7 @@
           <a:p>
             <a:fld id="{8102BAB4-8B8D-41DD-85C7-81A0CA962007}" type="datetimeFigureOut">
               <a:rPr lang="en-US" smtClean="0"/>
-              <a:t>12/1/2025</a:t>
+              <a:t>12/2/25</a:t>
             </a:fld>
             <a:endParaRPr lang="en-US"/>
           </a:p>
@@ -12598,7 +12598,7 @@
           <a:p>
             <a:fld id="{8102BAB4-8B8D-41DD-85C7-81A0CA962007}" type="datetimeFigureOut">
               <a:rPr lang="en-US" smtClean="0"/>
-              <a:t>12/1/2025</a:t>
+              <a:t>12/2/25</a:t>
             </a:fld>
             <a:endParaRPr lang="en-US"/>
           </a:p>
@@ -12845,7 +12845,7 @@
           <a:p>
             <a:fld id="{8102BAB4-8B8D-41DD-85C7-81A0CA962007}" type="datetimeFigureOut">
               <a:rPr lang="en-US" smtClean="0"/>
-              <a:t>12/1/2025</a:t>
+              <a:t>12/2/25</a:t>
             </a:fld>
             <a:endParaRPr lang="en-US"/>
           </a:p>
@@ -13051,7 +13051,7 @@
           <a:p>
             <a:fld id="{8102BAB4-8B8D-41DD-85C7-81A0CA962007}" type="datetimeFigureOut">
               <a:rPr lang="en-US" smtClean="0"/>
-              <a:t>12/1/2025</a:t>
+              <a:t>12/2/25</a:t>
             </a:fld>
             <a:endParaRPr lang="en-US"/>
           </a:p>
@@ -15306,7 +15306,7 @@
         <p:spPr>
           <a:xfrm>
             <a:off x="11865437" y="12722019"/>
-            <a:ext cx="7874607" cy="1292662"/>
+            <a:ext cx="7874607" cy="1692771"/>
           </a:xfrm>
           <a:prstGeom prst="rect">
             <a:avLst/>
@@ -15321,7 +15321,7 @@
           <a:p>
             <a:r>
               <a:rPr lang="en-US" sz="2600" dirty="0"/>
-              <a:t>Fig 1: We found no statistical difference in the number of coastal Oregon bee species visiting native vs. nonnative plants, even after standardizing the statistic. </a:t>
+              <a:t>Fig 1: We found no statistical difference in the number of coastal Oregon bee species visiting native vs. nonnative plants, even after standardizing the statistic. P-value: 0.45.</a:t>
             </a:r>
           </a:p>
         </p:txBody>
@@ -16193,23 +16193,6 @@
 </file>
 
 <file path=customXml/item1.xml><?xml version="1.0" encoding="utf-8"?>
-<?mso-contentType ?>
-<FormTemplates xmlns="http://schemas.microsoft.com/sharepoint/v3/contenttype/forms">
-  <Display>DocumentLibraryForm</Display>
-  <Edit>DocumentLibraryForm</Edit>
-  <New>DocumentLibraryForm</New>
-</FormTemplates>
-</file>
-
-<file path=customXml/item2.xml><?xml version="1.0" encoding="utf-8"?>
-<p:properties xmlns:p="http://schemas.microsoft.com/office/2006/metadata/properties" xmlns:xsi="http://www.w3.org/2001/XMLSchema-instance" xmlns:pc="http://schemas.microsoft.com/office/infopath/2007/PartnerControls">
-  <documentManagement>
-    <_activity xmlns="4a8057ab-f439-4764-a97c-4bf49cdf7355" xsi:nil="true"/>
-  </documentManagement>
-</p:properties>
-</file>
-
-<file path=customXml/item3.xml><?xml version="1.0" encoding="utf-8"?>
 <ct:contentTypeSchema xmlns:ct="http://schemas.microsoft.com/office/2006/metadata/contentType" xmlns:ma="http://schemas.microsoft.com/office/2006/metadata/properties/metaAttributes" ct:_="" ma:_="" ma:contentTypeName="Document" ma:contentTypeID="0x010100185480E115D50B4FADE0A535C341C9EE" ma:contentTypeVersion="9" ma:contentTypeDescription="Create a new document." ma:contentTypeScope="" ma:versionID="44ef893ee3d7f85ad0c23340fd16b0ba">
   <xsd:schema xmlns:xsd="http://www.w3.org/2001/XMLSchema" xmlns:xs="http://www.w3.org/2001/XMLSchema" xmlns:p="http://schemas.microsoft.com/office/2006/metadata/properties" xmlns:ns3="4a8057ab-f439-4764-a97c-4bf49cdf7355" xmlns:ns4="44f54941-32f9-4fbd-8504-058d13ff35bf" targetNamespace="http://schemas.microsoft.com/office/2006/metadata/properties" ma:root="true" ma:fieldsID="3037d3a0eef7b097f36ea6f79f5ff0c8" ns3:_="" ns4:_="">
     <xsd:import namespace="4a8057ab-f439-4764-a97c-4bf49cdf7355"/>
@@ -16404,10 +16387,38 @@
 </ct:contentTypeSchema>
 </file>
 
+<file path=customXml/item2.xml><?xml version="1.0" encoding="utf-8"?>
+<p:properties xmlns:p="http://schemas.microsoft.com/office/2006/metadata/properties" xmlns:xsi="http://www.w3.org/2001/XMLSchema-instance" xmlns:pc="http://schemas.microsoft.com/office/infopath/2007/PartnerControls">
+  <documentManagement>
+    <_activity xmlns="4a8057ab-f439-4764-a97c-4bf49cdf7355" xsi:nil="true"/>
+  </documentManagement>
+</p:properties>
+</file>
+
+<file path=customXml/item3.xml><?xml version="1.0" encoding="utf-8"?>
+<?mso-contentType ?>
+<FormTemplates xmlns="http://schemas.microsoft.com/sharepoint/v3/contenttype/forms">
+  <Display>DocumentLibraryForm</Display>
+  <Edit>DocumentLibraryForm</Edit>
+  <New>DocumentLibraryForm</New>
+</FormTemplates>
+</file>
+
 <file path=customXml/itemProps1.xml><?xml version="1.0" encoding="utf-8"?>
-<ds:datastoreItem xmlns:ds="http://schemas.openxmlformats.org/officeDocument/2006/customXml" ds:itemID="{2EAA44C3-3866-494C-9120-7B42F7968B8D}">
+<ds:datastoreItem xmlns:ds="http://schemas.openxmlformats.org/officeDocument/2006/customXml" ds:itemID="{4B4DB7DA-D8F5-47AB-9346-676E65899586}">
   <ds:schemaRefs>
-    <ds:schemaRef ds:uri="http://schemas.microsoft.com/sharepoint/v3/contenttype/forms"/>
+    <ds:schemaRef ds:uri="http://schemas.microsoft.com/office/2006/metadata/contentType"/>
+    <ds:schemaRef ds:uri="http://schemas.microsoft.com/office/2006/metadata/properties/metaAttributes"/>
+    <ds:schemaRef ds:uri="http://www.w3.org/2001/XMLSchema"/>
+    <ds:schemaRef ds:uri="http://schemas.microsoft.com/office/2006/metadata/properties"/>
+    <ds:schemaRef ds:uri="4a8057ab-f439-4764-a97c-4bf49cdf7355"/>
+    <ds:schemaRef ds:uri="44f54941-32f9-4fbd-8504-058d13ff35bf"/>
+    <ds:schemaRef ds:uri="http://schemas.microsoft.com/office/2006/documentManagement/types"/>
+    <ds:schemaRef ds:uri="http://schemas.microsoft.com/office/infopath/2007/PartnerControls"/>
+    <ds:schemaRef ds:uri="http://schemas.openxmlformats.org/package/2006/metadata/core-properties"/>
+    <ds:schemaRef ds:uri="http://purl.org/dc/elements/1.1/"/>
+    <ds:schemaRef ds:uri="http://purl.org/dc/terms/"/>
+    <ds:schemaRef ds:uri="http://schemas.microsoft.com/internal/obd"/>
   </ds:schemaRefs>
 </ds:datastoreItem>
 </file>
@@ -16430,20 +16441,9 @@
 </file>
 
 <file path=customXml/itemProps3.xml><?xml version="1.0" encoding="utf-8"?>
-<ds:datastoreItem xmlns:ds="http://schemas.openxmlformats.org/officeDocument/2006/customXml" ds:itemID="{4B4DB7DA-D8F5-47AB-9346-676E65899586}">
+<ds:datastoreItem xmlns:ds="http://schemas.openxmlformats.org/officeDocument/2006/customXml" ds:itemID="{2EAA44C3-3866-494C-9120-7B42F7968B8D}">
   <ds:schemaRefs>
-    <ds:schemaRef ds:uri="http://schemas.microsoft.com/office/2006/metadata/contentType"/>
-    <ds:schemaRef ds:uri="http://schemas.microsoft.com/office/2006/metadata/properties/metaAttributes"/>
-    <ds:schemaRef ds:uri="http://www.w3.org/2001/XMLSchema"/>
-    <ds:schemaRef ds:uri="http://schemas.microsoft.com/office/2006/metadata/properties"/>
-    <ds:schemaRef ds:uri="4a8057ab-f439-4764-a97c-4bf49cdf7355"/>
-    <ds:schemaRef ds:uri="44f54941-32f9-4fbd-8504-058d13ff35bf"/>
-    <ds:schemaRef ds:uri="http://schemas.microsoft.com/office/2006/documentManagement/types"/>
-    <ds:schemaRef ds:uri="http://schemas.microsoft.com/office/infopath/2007/PartnerControls"/>
-    <ds:schemaRef ds:uri="http://schemas.openxmlformats.org/package/2006/metadata/core-properties"/>
-    <ds:schemaRef ds:uri="http://purl.org/dc/elements/1.1/"/>
-    <ds:schemaRef ds:uri="http://purl.org/dc/terms/"/>
-    <ds:schemaRef ds:uri="http://schemas.microsoft.com/internal/obd"/>
+    <ds:schemaRef ds:uri="http://schemas.microsoft.com/sharepoint/v3/contenttype/forms"/>
   </ds:schemaRefs>
 </ds:datastoreItem>
 </file>
</xml_diff>

<commit_message>
Made a minor edit of the title section
</commit_message>
<xml_diff>
--- a/final_proj_posterCLJL.pptx
+++ b/final_proj_posterCLJL.pptx
@@ -3317,8 +3317,8 @@
     <dgm:cxn modelId="{7A633D42-DFD7-42D5-B49A-D8E46BB28DED}" type="presOf" srcId="{6EDEF63E-296D-4E9C-BD18-5F05AA4439C3}" destId="{9FA36F8D-1831-4E9F-B0E4-5C32923C7C1C}" srcOrd="0" destOrd="0" presId="urn:microsoft.com/office/officeart/2008/layout/HorizontalMultiLevelHierarchy"/>
     <dgm:cxn modelId="{662EE444-6A8C-42B4-8896-0561342E96C6}" type="presOf" srcId="{19A5F07E-93B4-47DF-9980-F80757511EE6}" destId="{09184C92-221E-45F1-8661-97B5B5473431}" srcOrd="0" destOrd="0" presId="urn:microsoft.com/office/officeart/2008/layout/HorizontalMultiLevelHierarchy"/>
     <dgm:cxn modelId="{E7283647-7A5E-4771-8DE8-D659E34D3BAB}" srcId="{031260B9-C8F0-415D-BB12-5F98FAD0A145}" destId="{F3A1B37A-355A-47FF-82E6-EE69A27B8B87}" srcOrd="0" destOrd="0" parTransId="{6EDEF63E-296D-4E9C-BD18-5F05AA4439C3}" sibTransId="{97455F4F-5AF4-41A3-B0B7-898CB48908A3}"/>
+    <dgm:cxn modelId="{0191024F-A23A-44EE-9732-E34FA529F59F}" srcId="{0ACCDA85-508B-4AFF-9B4D-AAC2A6E3B5A4}" destId="{031260B9-C8F0-415D-BB12-5F98FAD0A145}" srcOrd="0" destOrd="0" parTransId="{507B4C9D-2538-4686-9879-93E2ABEE8BDC}" sibTransId="{7812B71F-59E0-4A94-854E-87583EA1C084}"/>
     <dgm:cxn modelId="{3467B36D-6A0A-4F2D-8C57-9A880771DCB1}" type="presOf" srcId="{5AD33756-1903-4ABE-B536-A47F74E612A4}" destId="{B1ED1BA2-5753-4612-941E-BB160DE8A5B2}" srcOrd="0" destOrd="0" presId="urn:microsoft.com/office/officeart/2008/layout/HorizontalMultiLevelHierarchy"/>
-    <dgm:cxn modelId="{0191024F-A23A-44EE-9732-E34FA529F59F}" srcId="{0ACCDA85-508B-4AFF-9B4D-AAC2A6E3B5A4}" destId="{031260B9-C8F0-415D-BB12-5F98FAD0A145}" srcOrd="0" destOrd="0" parTransId="{507B4C9D-2538-4686-9879-93E2ABEE8BDC}" sibTransId="{7812B71F-59E0-4A94-854E-87583EA1C084}"/>
     <dgm:cxn modelId="{B96CD08C-0B3B-470C-BC94-A2EB3CD59C39}" type="presOf" srcId="{8D9744CC-AE09-4D43-AC86-17D836FF01D7}" destId="{F00423B9-6E23-405A-B4AA-BEE0C6FF45F6}" srcOrd="0" destOrd="0" presId="urn:microsoft.com/office/officeart/2008/layout/HorizontalMultiLevelHierarchy"/>
     <dgm:cxn modelId="{FC2A228D-DEB4-4B90-867D-ABA02E6D8194}" type="presOf" srcId="{19A5F07E-93B4-47DF-9980-F80757511EE6}" destId="{A3BA7661-C915-49DD-AADD-BEAE63E17B35}" srcOrd="1" destOrd="0" presId="urn:microsoft.com/office/officeart/2008/layout/HorizontalMultiLevelHierarchy"/>
     <dgm:cxn modelId="{EF72D691-001D-4C78-8467-08DC3869845A}" srcId="{031260B9-C8F0-415D-BB12-5F98FAD0A145}" destId="{8D9744CC-AE09-4D43-AC86-17D836FF01D7}" srcOrd="3" destOrd="0" parTransId="{48E6F3B3-F97D-4588-BE4D-9DBF0607AB79}" sibTransId="{39A3203E-DD2F-4C73-8F31-C0DA3A238537}"/>
@@ -10151,7 +10151,7 @@
           <a:p>
             <a:fld id="{D0FE861C-486B-4E18-A0E9-A790238A915C}" type="datetimeFigureOut">
               <a:rPr lang="en-US" smtClean="0"/>
-              <a:t>12/3/2025</a:t>
+              <a:t>12/6/25</a:t>
             </a:fld>
             <a:endParaRPr lang="en-US"/>
           </a:p>
@@ -10685,7 +10685,7 @@
           <a:p>
             <a:fld id="{8102BAB4-8B8D-41DD-85C7-81A0CA962007}" type="datetimeFigureOut">
               <a:rPr lang="en-US" smtClean="0"/>
-              <a:t>12/3/2025</a:t>
+              <a:t>12/6/25</a:t>
             </a:fld>
             <a:endParaRPr lang="en-US"/>
           </a:p>
@@ -10848,7 +10848,7 @@
           <a:p>
             <a:fld id="{8102BAB4-8B8D-41DD-85C7-81A0CA962007}" type="datetimeFigureOut">
               <a:rPr lang="en-US" smtClean="0"/>
-              <a:t>12/3/2025</a:t>
+              <a:t>12/6/25</a:t>
             </a:fld>
             <a:endParaRPr lang="en-US"/>
           </a:p>
@@ -11021,7 +11021,7 @@
           <a:p>
             <a:fld id="{8102BAB4-8B8D-41DD-85C7-81A0CA962007}" type="datetimeFigureOut">
               <a:rPr lang="en-US" smtClean="0"/>
-              <a:t>12/3/2025</a:t>
+              <a:t>12/6/25</a:t>
             </a:fld>
             <a:endParaRPr lang="en-US"/>
           </a:p>
@@ -11184,7 +11184,7 @@
           <a:p>
             <a:fld id="{8102BAB4-8B8D-41DD-85C7-81A0CA962007}" type="datetimeFigureOut">
               <a:rPr lang="en-US" smtClean="0"/>
-              <a:t>12/3/2025</a:t>
+              <a:t>12/6/25</a:t>
             </a:fld>
             <a:endParaRPr lang="en-US"/>
           </a:p>
@@ -11424,7 +11424,7 @@
           <a:p>
             <a:fld id="{8102BAB4-8B8D-41DD-85C7-81A0CA962007}" type="datetimeFigureOut">
               <a:rPr lang="en-US" smtClean="0"/>
-              <a:t>12/3/2025</a:t>
+              <a:t>12/6/25</a:t>
             </a:fld>
             <a:endParaRPr lang="en-US"/>
           </a:p>
@@ -11704,7 +11704,7 @@
           <a:p>
             <a:fld id="{8102BAB4-8B8D-41DD-85C7-81A0CA962007}" type="datetimeFigureOut">
               <a:rPr lang="en-US" smtClean="0"/>
-              <a:t>12/3/2025</a:t>
+              <a:t>12/6/25</a:t>
             </a:fld>
             <a:endParaRPr lang="en-US"/>
           </a:p>
@@ -12118,7 +12118,7 @@
           <a:p>
             <a:fld id="{8102BAB4-8B8D-41DD-85C7-81A0CA962007}" type="datetimeFigureOut">
               <a:rPr lang="en-US" smtClean="0"/>
-              <a:t>12/3/2025</a:t>
+              <a:t>12/6/25</a:t>
             </a:fld>
             <a:endParaRPr lang="en-US"/>
           </a:p>
@@ -12230,7 +12230,7 @@
           <a:p>
             <a:fld id="{8102BAB4-8B8D-41DD-85C7-81A0CA962007}" type="datetimeFigureOut">
               <a:rPr lang="en-US" smtClean="0"/>
-              <a:t>12/3/2025</a:t>
+              <a:t>12/6/25</a:t>
             </a:fld>
             <a:endParaRPr lang="en-US"/>
           </a:p>
@@ -12320,7 +12320,7 @@
           <a:p>
             <a:fld id="{8102BAB4-8B8D-41DD-85C7-81A0CA962007}" type="datetimeFigureOut">
               <a:rPr lang="en-US" smtClean="0"/>
-              <a:t>12/3/2025</a:t>
+              <a:t>12/6/25</a:t>
             </a:fld>
             <a:endParaRPr lang="en-US"/>
           </a:p>
@@ -12590,7 +12590,7 @@
           <a:p>
             <a:fld id="{8102BAB4-8B8D-41DD-85C7-81A0CA962007}" type="datetimeFigureOut">
               <a:rPr lang="en-US" smtClean="0"/>
-              <a:t>12/3/2025</a:t>
+              <a:t>12/6/25</a:t>
             </a:fld>
             <a:endParaRPr lang="en-US"/>
           </a:p>
@@ -12837,7 +12837,7 @@
           <a:p>
             <a:fld id="{8102BAB4-8B8D-41DD-85C7-81A0CA962007}" type="datetimeFigureOut">
               <a:rPr lang="en-US" smtClean="0"/>
-              <a:t>12/3/2025</a:t>
+              <a:t>12/6/25</a:t>
             </a:fld>
             <a:endParaRPr lang="en-US"/>
           </a:p>
@@ -13043,7 +13043,7 @@
           <a:p>
             <a:fld id="{8102BAB4-8B8D-41DD-85C7-81A0CA962007}" type="datetimeFigureOut">
               <a:rPr lang="en-US" smtClean="0"/>
-              <a:t>12/3/2025</a:t>
+              <a:t>12/6/25</a:t>
             </a:fld>
             <a:endParaRPr lang="en-US"/>
           </a:p>
@@ -13930,7 +13930,7 @@
         </p:nvSpPr>
         <p:spPr>
           <a:xfrm>
-            <a:off x="818078" y="4254554"/>
+            <a:off x="818078" y="4813653"/>
             <a:ext cx="36671250" cy="732260"/>
           </a:xfrm>
           <a:prstGeom prst="rect">
@@ -14076,7 +14076,7 @@
         </p:nvSpPr>
         <p:spPr>
           <a:xfrm>
-            <a:off x="800100" y="5225661"/>
+            <a:off x="784740" y="5513731"/>
             <a:ext cx="36737926" cy="577081"/>
           </a:xfrm>
           <a:prstGeom prst="rect">
@@ -17081,12 +17081,11 @@
 </file>
 
 <file path=customXml/item1.xml><?xml version="1.0" encoding="utf-8"?>
-<?mso-contentType ?>
-<FormTemplates xmlns="http://schemas.microsoft.com/sharepoint/v3/contenttype/forms">
-  <Display>DocumentLibraryForm</Display>
-  <Edit>DocumentLibraryForm</Edit>
-  <New>DocumentLibraryForm</New>
-</FormTemplates>
+<p:properties xmlns:p="http://schemas.microsoft.com/office/2006/metadata/properties" xmlns:xsi="http://www.w3.org/2001/XMLSchema-instance" xmlns:pc="http://schemas.microsoft.com/office/infopath/2007/PartnerControls">
+  <documentManagement>
+    <_activity xmlns="4a8057ab-f439-4764-a97c-4bf49cdf7355" xsi:nil="true"/>
+  </documentManagement>
+</p:properties>
 </file>
 
 <file path=customXml/item2.xml><?xml version="1.0" encoding="utf-8"?>
@@ -17285,17 +17284,27 @@
 </file>
 
 <file path=customXml/item3.xml><?xml version="1.0" encoding="utf-8"?>
-<p:properties xmlns:p="http://schemas.microsoft.com/office/2006/metadata/properties" xmlns:xsi="http://www.w3.org/2001/XMLSchema-instance" xmlns:pc="http://schemas.microsoft.com/office/infopath/2007/PartnerControls">
-  <documentManagement>
-    <_activity xmlns="4a8057ab-f439-4764-a97c-4bf49cdf7355" xsi:nil="true"/>
-  </documentManagement>
-</p:properties>
+<?mso-contentType ?>
+<FormTemplates xmlns="http://schemas.microsoft.com/sharepoint/v3/contenttype/forms">
+  <Display>DocumentLibraryForm</Display>
+  <Edit>DocumentLibraryForm</Edit>
+  <New>DocumentLibraryForm</New>
+</FormTemplates>
 </file>
 
 <file path=customXml/itemProps1.xml><?xml version="1.0" encoding="utf-8"?>
-<ds:datastoreItem xmlns:ds="http://schemas.openxmlformats.org/officeDocument/2006/customXml" ds:itemID="{2EAA44C3-3866-494C-9120-7B42F7968B8D}">
+<ds:datastoreItem xmlns:ds="http://schemas.openxmlformats.org/officeDocument/2006/customXml" ds:itemID="{43ED6497-CB12-4BE5-A6D8-27969E015944}">
   <ds:schemaRefs>
-    <ds:schemaRef ds:uri="http://schemas.microsoft.com/sharepoint/v3/contenttype/forms"/>
+    <ds:schemaRef ds:uri="http://schemas.microsoft.com/office/infopath/2007/PartnerControls"/>
+    <ds:schemaRef ds:uri="http://www.w3.org/XML/1998/namespace"/>
+    <ds:schemaRef ds:uri="http://purl.org/dc/terms/"/>
+    <ds:schemaRef ds:uri="44f54941-32f9-4fbd-8504-058d13ff35bf"/>
+    <ds:schemaRef ds:uri="4a8057ab-f439-4764-a97c-4bf49cdf7355"/>
+    <ds:schemaRef ds:uri="http://purl.org/dc/elements/1.1/"/>
+    <ds:schemaRef ds:uri="http://schemas.microsoft.com/office/2006/documentManagement/types"/>
+    <ds:schemaRef ds:uri="http://schemas.openxmlformats.org/package/2006/metadata/core-properties"/>
+    <ds:schemaRef ds:uri="http://schemas.microsoft.com/office/2006/metadata/properties"/>
+    <ds:schemaRef ds:uri="http://purl.org/dc/dcmitype/"/>
   </ds:schemaRefs>
 </ds:datastoreItem>
 </file>
@@ -17320,18 +17329,9 @@
 </file>
 
 <file path=customXml/itemProps3.xml><?xml version="1.0" encoding="utf-8"?>
-<ds:datastoreItem xmlns:ds="http://schemas.openxmlformats.org/officeDocument/2006/customXml" ds:itemID="{43ED6497-CB12-4BE5-A6D8-27969E015944}">
+<ds:datastoreItem xmlns:ds="http://schemas.openxmlformats.org/officeDocument/2006/customXml" ds:itemID="{2EAA44C3-3866-494C-9120-7B42F7968B8D}">
   <ds:schemaRefs>
-    <ds:schemaRef ds:uri="http://schemas.microsoft.com/office/infopath/2007/PartnerControls"/>
-    <ds:schemaRef ds:uri="http://www.w3.org/XML/1998/namespace"/>
-    <ds:schemaRef ds:uri="http://purl.org/dc/terms/"/>
-    <ds:schemaRef ds:uri="44f54941-32f9-4fbd-8504-058d13ff35bf"/>
-    <ds:schemaRef ds:uri="4a8057ab-f439-4764-a97c-4bf49cdf7355"/>
-    <ds:schemaRef ds:uri="http://purl.org/dc/elements/1.1/"/>
-    <ds:schemaRef ds:uri="http://schemas.microsoft.com/office/2006/documentManagement/types"/>
-    <ds:schemaRef ds:uri="http://schemas.openxmlformats.org/package/2006/metadata/core-properties"/>
-    <ds:schemaRef ds:uri="http://schemas.microsoft.com/office/2006/metadata/properties"/>
-    <ds:schemaRef ds:uri="http://purl.org/dc/dcmitype/"/>
+    <ds:schemaRef ds:uri="http://schemas.microsoft.com/sharepoint/v3/contenttype/forms"/>
   </ds:schemaRefs>
 </ds:datastoreItem>
 </file>
</xml_diff>